<commit_message>
fixed figure themes and some ms drafting
</commit_message>
<xml_diff>
--- a/cache/maps/map.pptx
+++ b/cache/maps/map.pptx
@@ -5,10 +5,11 @@
     <p:sldMasterId id="2147483648" r:id="rId1"/>
   </p:sldMasterIdLst>
   <p:notesMasterIdLst>
-    <p:notesMasterId r:id="rId3"/>
+    <p:notesMasterId r:id="rId4"/>
   </p:notesMasterIdLst>
   <p:sldIdLst>
     <p:sldId id="256" r:id="rId2"/>
+    <p:sldId id="257" r:id="rId3"/>
   </p:sldIdLst>
   <p:sldSz cx="12192000" cy="6858000"/>
   <p:notesSz cx="6858000" cy="9144000"/>
@@ -115,6 +116,195 @@
 </p:presentation>
 </file>
 
+<file path=ppt/revisionInfo.xml><?xml version="1.0" encoding="utf-8"?>
+<p1510:revInfo xmlns:a="http://schemas.openxmlformats.org/drawingml/2006/main" xmlns:r="http://schemas.openxmlformats.org/officeDocument/2006/relationships" xmlns:p1510="http://schemas.microsoft.com/office/powerpoint/2015/10/main">
+  <p1510:revLst>
+    <p1510:client id="{E1E9B5EC-4ACC-4110-8226-499975F2B60C}" v="13" dt="2021-11-30T21:06:02.983"/>
+  </p1510:revLst>
+</p1510:revInfo>
+</file>
+
+<file path=ppt/changesInfos/changesInfo1.xml><?xml version="1.0" encoding="utf-8"?>
+<pc:chgInfo xmlns:a="http://schemas.openxmlformats.org/drawingml/2006/main" xmlns:r="http://schemas.openxmlformats.org/officeDocument/2006/relationships" xmlns:ac="http://schemas.microsoft.com/office/drawing/2013/main/command" xmlns:pc="http://schemas.microsoft.com/office/powerpoint/2013/main/command">
+  <pc:docChgLst>
+    <pc:chgData name="Craig Brinkerhoff" userId="4ca67c74-3213-4250-9c32-077ebf257a4d" providerId="ADAL" clId="{E1E9B5EC-4ACC-4110-8226-499975F2B60C}"/>
+    <pc:docChg chg="undo custSel addSld modSld">
+      <pc:chgData name="Craig Brinkerhoff" userId="4ca67c74-3213-4250-9c32-077ebf257a4d" providerId="ADAL" clId="{E1E9B5EC-4ACC-4110-8226-499975F2B60C}" dt="2021-11-30T21:08:32.560" v="270" actId="1076"/>
+      <pc:docMkLst>
+        <pc:docMk/>
+      </pc:docMkLst>
+      <pc:sldChg chg="addSp delSp modSp new mod">
+        <pc:chgData name="Craig Brinkerhoff" userId="4ca67c74-3213-4250-9c32-077ebf257a4d" providerId="ADAL" clId="{E1E9B5EC-4ACC-4110-8226-499975F2B60C}" dt="2021-11-30T21:08:32.560" v="270" actId="1076"/>
+        <pc:sldMkLst>
+          <pc:docMk/>
+          <pc:sldMk cId="2595326838" sldId="257"/>
+        </pc:sldMkLst>
+        <pc:spChg chg="add mod">
+          <ac:chgData name="Craig Brinkerhoff" userId="4ca67c74-3213-4250-9c32-077ebf257a4d" providerId="ADAL" clId="{E1E9B5EC-4ACC-4110-8226-499975F2B60C}" dt="2021-11-30T21:03:24.138" v="109" actId="1076"/>
+          <ac:spMkLst>
+            <pc:docMk/>
+            <pc:sldMk cId="2595326838" sldId="257"/>
+            <ac:spMk id="4" creationId="{7F82710E-F7F7-490C-9E7C-FB4FA532E983}"/>
+          </ac:spMkLst>
+        </pc:spChg>
+        <pc:spChg chg="add mod">
+          <ac:chgData name="Craig Brinkerhoff" userId="4ca67c74-3213-4250-9c32-077ebf257a4d" providerId="ADAL" clId="{E1E9B5EC-4ACC-4110-8226-499975F2B60C}" dt="2021-11-30T21:03:32.046" v="113" actId="1076"/>
+          <ac:spMkLst>
+            <pc:docMk/>
+            <pc:sldMk cId="2595326838" sldId="257"/>
+            <ac:spMk id="7" creationId="{A444AF9C-2B9A-4C41-855B-4294EC50873B}"/>
+          </ac:spMkLst>
+        </pc:spChg>
+        <pc:spChg chg="add mod">
+          <ac:chgData name="Craig Brinkerhoff" userId="4ca67c74-3213-4250-9c32-077ebf257a4d" providerId="ADAL" clId="{E1E9B5EC-4ACC-4110-8226-499975F2B60C}" dt="2021-11-30T21:03:42.301" v="117" actId="1076"/>
+          <ac:spMkLst>
+            <pc:docMk/>
+            <pc:sldMk cId="2595326838" sldId="257"/>
+            <ac:spMk id="10" creationId="{13D412FE-D096-4572-8010-1651D6F19C81}"/>
+          </ac:spMkLst>
+        </pc:spChg>
+        <pc:spChg chg="add mod">
+          <ac:chgData name="Craig Brinkerhoff" userId="4ca67c74-3213-4250-9c32-077ebf257a4d" providerId="ADAL" clId="{E1E9B5EC-4ACC-4110-8226-499975F2B60C}" dt="2021-11-30T21:08:32.560" v="270" actId="1076"/>
+          <ac:spMkLst>
+            <pc:docMk/>
+            <pc:sldMk cId="2595326838" sldId="257"/>
+            <ac:spMk id="13" creationId="{EE849065-EA26-4E8D-9FA1-74C1C82BB7AC}"/>
+          </ac:spMkLst>
+        </pc:spChg>
+        <pc:spChg chg="add mod">
+          <ac:chgData name="Craig Brinkerhoff" userId="4ca67c74-3213-4250-9c32-077ebf257a4d" providerId="ADAL" clId="{E1E9B5EC-4ACC-4110-8226-499975F2B60C}" dt="2021-11-30T21:08:32.560" v="270" actId="1076"/>
+          <ac:spMkLst>
+            <pc:docMk/>
+            <pc:sldMk cId="2595326838" sldId="257"/>
+            <ac:spMk id="14" creationId="{1B3F374B-E2DC-49FC-948E-3511C130668C}"/>
+          </ac:spMkLst>
+        </pc:spChg>
+        <pc:spChg chg="add mod">
+          <ac:chgData name="Craig Brinkerhoff" userId="4ca67c74-3213-4250-9c32-077ebf257a4d" providerId="ADAL" clId="{E1E9B5EC-4ACC-4110-8226-499975F2B60C}" dt="2021-11-30T21:08:32.560" v="270" actId="1076"/>
+          <ac:spMkLst>
+            <pc:docMk/>
+            <pc:sldMk cId="2595326838" sldId="257"/>
+            <ac:spMk id="15" creationId="{01409D9B-961C-4016-9FFB-B9854778EE87}"/>
+          </ac:spMkLst>
+        </pc:spChg>
+        <pc:spChg chg="add mod">
+          <ac:chgData name="Craig Brinkerhoff" userId="4ca67c74-3213-4250-9c32-077ebf257a4d" providerId="ADAL" clId="{E1E9B5EC-4ACC-4110-8226-499975F2B60C}" dt="2021-11-30T21:08:32.560" v="270" actId="1076"/>
+          <ac:spMkLst>
+            <pc:docMk/>
+            <pc:sldMk cId="2595326838" sldId="257"/>
+            <ac:spMk id="16" creationId="{AD39DA37-B73F-4523-A583-7085DCC7BE36}"/>
+          </ac:spMkLst>
+        </pc:spChg>
+        <pc:spChg chg="add del mod">
+          <ac:chgData name="Craig Brinkerhoff" userId="4ca67c74-3213-4250-9c32-077ebf257a4d" providerId="ADAL" clId="{E1E9B5EC-4ACC-4110-8226-499975F2B60C}" dt="2021-11-30T21:04:12.883" v="120"/>
+          <ac:spMkLst>
+            <pc:docMk/>
+            <pc:sldMk cId="2595326838" sldId="257"/>
+            <ac:spMk id="25" creationId="{58303865-6580-4A31-B7DB-9368BC0896EF}"/>
+          </ac:spMkLst>
+        </pc:spChg>
+        <pc:spChg chg="add mod">
+          <ac:chgData name="Craig Brinkerhoff" userId="4ca67c74-3213-4250-9c32-077ebf257a4d" providerId="ADAL" clId="{E1E9B5EC-4ACC-4110-8226-499975F2B60C}" dt="2021-11-30T21:07:47.501" v="262" actId="207"/>
+          <ac:spMkLst>
+            <pc:docMk/>
+            <pc:sldMk cId="2595326838" sldId="257"/>
+            <ac:spMk id="26" creationId="{A523F9B0-5368-4B8A-A3D4-F21B5C89366E}"/>
+          </ac:spMkLst>
+        </pc:spChg>
+        <pc:spChg chg="add mod">
+          <ac:chgData name="Craig Brinkerhoff" userId="4ca67c74-3213-4250-9c32-077ebf257a4d" providerId="ADAL" clId="{E1E9B5EC-4ACC-4110-8226-499975F2B60C}" dt="2021-11-30T21:07:50.138" v="263" actId="207"/>
+          <ac:spMkLst>
+            <pc:docMk/>
+            <pc:sldMk cId="2595326838" sldId="257"/>
+            <ac:spMk id="27" creationId="{00CE480E-AEC3-4E69-855D-1DE28CBE320F}"/>
+          </ac:spMkLst>
+        </pc:spChg>
+        <pc:spChg chg="add mod">
+          <ac:chgData name="Craig Brinkerhoff" userId="4ca67c74-3213-4250-9c32-077ebf257a4d" providerId="ADAL" clId="{E1E9B5EC-4ACC-4110-8226-499975F2B60C}" dt="2021-11-30T21:07:52.303" v="264" actId="207"/>
+          <ac:spMkLst>
+            <pc:docMk/>
+            <pc:sldMk cId="2595326838" sldId="257"/>
+            <ac:spMk id="28" creationId="{9B9E3660-C4D5-42F9-921B-F71A5CDDB5DF}"/>
+          </ac:spMkLst>
+        </pc:spChg>
+        <pc:spChg chg="add mod">
+          <ac:chgData name="Craig Brinkerhoff" userId="4ca67c74-3213-4250-9c32-077ebf257a4d" providerId="ADAL" clId="{E1E9B5EC-4ACC-4110-8226-499975F2B60C}" dt="2021-11-30T21:08:25.107" v="269" actId="1076"/>
+          <ac:spMkLst>
+            <pc:docMk/>
+            <pc:sldMk cId="2595326838" sldId="257"/>
+            <ac:spMk id="32" creationId="{FA6A484E-C77B-45B5-87F9-50C5CD52A81F}"/>
+          </ac:spMkLst>
+        </pc:spChg>
+        <pc:picChg chg="add mod">
+          <ac:chgData name="Craig Brinkerhoff" userId="4ca67c74-3213-4250-9c32-077ebf257a4d" providerId="ADAL" clId="{E1E9B5EC-4ACC-4110-8226-499975F2B60C}" dt="2021-11-30T21:00:29.373" v="46" actId="1582"/>
+          <ac:picMkLst>
+            <pc:docMk/>
+            <pc:sldMk cId="2595326838" sldId="257"/>
+            <ac:picMk id="3" creationId="{80672B98-3669-40FA-9427-A1C54D0B20C9}"/>
+          </ac:picMkLst>
+        </pc:picChg>
+        <pc:picChg chg="add mod">
+          <ac:chgData name="Craig Brinkerhoff" userId="4ca67c74-3213-4250-9c32-077ebf257a4d" providerId="ADAL" clId="{E1E9B5EC-4ACC-4110-8226-499975F2B60C}" dt="2021-11-30T21:00:33.204" v="48" actId="1582"/>
+          <ac:picMkLst>
+            <pc:docMk/>
+            <pc:sldMk cId="2595326838" sldId="257"/>
+            <ac:picMk id="6" creationId="{CEA5872F-B2C5-40B5-8681-AA20492E6360}"/>
+          </ac:picMkLst>
+        </pc:picChg>
+        <pc:picChg chg="add mod">
+          <ac:chgData name="Craig Brinkerhoff" userId="4ca67c74-3213-4250-9c32-077ebf257a4d" providerId="ADAL" clId="{E1E9B5EC-4ACC-4110-8226-499975F2B60C}" dt="2021-11-30T21:04:58.370" v="166" actId="1076"/>
+          <ac:picMkLst>
+            <pc:docMk/>
+            <pc:sldMk cId="2595326838" sldId="257"/>
+            <ac:picMk id="9" creationId="{47DA8961-FF82-4BD5-B2FB-A3B74B3C7421}"/>
+          </ac:picMkLst>
+        </pc:picChg>
+        <pc:picChg chg="add mod">
+          <ac:chgData name="Craig Brinkerhoff" userId="4ca67c74-3213-4250-9c32-077ebf257a4d" providerId="ADAL" clId="{E1E9B5EC-4ACC-4110-8226-499975F2B60C}" dt="2021-11-30T21:08:32.560" v="270" actId="1076"/>
+          <ac:picMkLst>
+            <pc:docMk/>
+            <pc:sldMk cId="2595326838" sldId="257"/>
+            <ac:picMk id="12" creationId="{0FF468C4-AFCF-453A-8B98-AE356A5D2D22}"/>
+          </ac:picMkLst>
+        </pc:picChg>
+        <pc:picChg chg="add del mod modCrop">
+          <ac:chgData name="Craig Brinkerhoff" userId="4ca67c74-3213-4250-9c32-077ebf257a4d" providerId="ADAL" clId="{E1E9B5EC-4ACC-4110-8226-499975F2B60C}" dt="2021-11-30T21:05:54.196" v="172" actId="478"/>
+          <ac:picMkLst>
+            <pc:docMk/>
+            <pc:sldMk cId="2595326838" sldId="257"/>
+            <ac:picMk id="31" creationId="{0E67570F-F7CC-458E-AC35-06805DEE184C}"/>
+          </ac:picMkLst>
+        </pc:picChg>
+        <pc:cxnChg chg="add mod ord">
+          <ac:chgData name="Craig Brinkerhoff" userId="4ca67c74-3213-4250-9c32-077ebf257a4d" providerId="ADAL" clId="{E1E9B5EC-4ACC-4110-8226-499975F2B60C}" dt="2021-11-30T21:08:32.560" v="270" actId="1076"/>
+          <ac:cxnSpMkLst>
+            <pc:docMk/>
+            <pc:sldMk cId="2595326838" sldId="257"/>
+            <ac:cxnSpMk id="18" creationId="{01B9A262-088E-498C-951B-923BE4590C0B}"/>
+          </ac:cxnSpMkLst>
+        </pc:cxnChg>
+        <pc:cxnChg chg="add mod">
+          <ac:chgData name="Craig Brinkerhoff" userId="4ca67c74-3213-4250-9c32-077ebf257a4d" providerId="ADAL" clId="{E1E9B5EC-4ACC-4110-8226-499975F2B60C}" dt="2021-11-30T21:08:32.560" v="270" actId="1076"/>
+          <ac:cxnSpMkLst>
+            <pc:docMk/>
+            <pc:sldMk cId="2595326838" sldId="257"/>
+            <ac:cxnSpMk id="19" creationId="{420AB400-7C4A-46BD-B025-AA6C0FBF56FB}"/>
+          </ac:cxnSpMkLst>
+        </pc:cxnChg>
+        <pc:cxnChg chg="add mod">
+          <ac:chgData name="Craig Brinkerhoff" userId="4ca67c74-3213-4250-9c32-077ebf257a4d" providerId="ADAL" clId="{E1E9B5EC-4ACC-4110-8226-499975F2B60C}" dt="2021-11-30T21:08:32.560" v="270" actId="1076"/>
+          <ac:cxnSpMkLst>
+            <pc:docMk/>
+            <pc:sldMk cId="2595326838" sldId="257"/>
+            <ac:cxnSpMk id="22" creationId="{436508F2-DA52-4342-96D6-199D3DCB015C}"/>
+          </ac:cxnSpMkLst>
+        </pc:cxnChg>
+      </pc:sldChg>
+    </pc:docChg>
+  </pc:docChgLst>
+</pc:chgInfo>
+</file>
+
 <file path=ppt/notesMasters/notesMaster1.xml><?xml version="1.0" encoding="utf-8"?>
 <p:notesMaster xmlns:a="http://schemas.openxmlformats.org/drawingml/2006/main" xmlns:r="http://schemas.openxmlformats.org/officeDocument/2006/relationships" xmlns:p="http://schemas.openxmlformats.org/presentationml/2006/main">
   <p:cSld>
@@ -197,7 +387,7 @@
           <a:p>
             <a:fld id="{FB8D5E24-018C-4951-9EB7-7E9E11B96917}" type="datetimeFigureOut">
               <a:rPr lang="en-US" smtClean="0"/>
-              <a:t>7/13/2021</a:t>
+              <a:t>11/30/2021</a:t>
             </a:fld>
             <a:endParaRPr lang="en-US"/>
           </a:p>
@@ -708,7 +898,7 @@
           <a:p>
             <a:fld id="{1148A964-4D61-4951-A92D-54AF28397704}" type="datetimeFigureOut">
               <a:rPr lang="en-US" smtClean="0"/>
-              <a:t>7/13/2021</a:t>
+              <a:t>11/30/2021</a:t>
             </a:fld>
             <a:endParaRPr lang="en-US"/>
           </a:p>
@@ -906,7 +1096,7 @@
           <a:p>
             <a:fld id="{1148A964-4D61-4951-A92D-54AF28397704}" type="datetimeFigureOut">
               <a:rPr lang="en-US" smtClean="0"/>
-              <a:t>7/13/2021</a:t>
+              <a:t>11/30/2021</a:t>
             </a:fld>
             <a:endParaRPr lang="en-US"/>
           </a:p>
@@ -1114,7 +1304,7 @@
           <a:p>
             <a:fld id="{1148A964-4D61-4951-A92D-54AF28397704}" type="datetimeFigureOut">
               <a:rPr lang="en-US" smtClean="0"/>
-              <a:t>7/13/2021</a:t>
+              <a:t>11/30/2021</a:t>
             </a:fld>
             <a:endParaRPr lang="en-US"/>
           </a:p>
@@ -1312,7 +1502,7 @@
           <a:p>
             <a:fld id="{1148A964-4D61-4951-A92D-54AF28397704}" type="datetimeFigureOut">
               <a:rPr lang="en-US" smtClean="0"/>
-              <a:t>7/13/2021</a:t>
+              <a:t>11/30/2021</a:t>
             </a:fld>
             <a:endParaRPr lang="en-US"/>
           </a:p>
@@ -1587,7 +1777,7 @@
           <a:p>
             <a:fld id="{1148A964-4D61-4951-A92D-54AF28397704}" type="datetimeFigureOut">
               <a:rPr lang="en-US" smtClean="0"/>
-              <a:t>7/13/2021</a:t>
+              <a:t>11/30/2021</a:t>
             </a:fld>
             <a:endParaRPr lang="en-US"/>
           </a:p>
@@ -1852,7 +2042,7 @@
           <a:p>
             <a:fld id="{1148A964-4D61-4951-A92D-54AF28397704}" type="datetimeFigureOut">
               <a:rPr lang="en-US" smtClean="0"/>
-              <a:t>7/13/2021</a:t>
+              <a:t>11/30/2021</a:t>
             </a:fld>
             <a:endParaRPr lang="en-US"/>
           </a:p>
@@ -2264,7 +2454,7 @@
           <a:p>
             <a:fld id="{1148A964-4D61-4951-A92D-54AF28397704}" type="datetimeFigureOut">
               <a:rPr lang="en-US" smtClean="0"/>
-              <a:t>7/13/2021</a:t>
+              <a:t>11/30/2021</a:t>
             </a:fld>
             <a:endParaRPr lang="en-US"/>
           </a:p>
@@ -2405,7 +2595,7 @@
           <a:p>
             <a:fld id="{1148A964-4D61-4951-A92D-54AF28397704}" type="datetimeFigureOut">
               <a:rPr lang="en-US" smtClean="0"/>
-              <a:t>7/13/2021</a:t>
+              <a:t>11/30/2021</a:t>
             </a:fld>
             <a:endParaRPr lang="en-US"/>
           </a:p>
@@ -2518,7 +2708,7 @@
           <a:p>
             <a:fld id="{1148A964-4D61-4951-A92D-54AF28397704}" type="datetimeFigureOut">
               <a:rPr lang="en-US" smtClean="0"/>
-              <a:t>7/13/2021</a:t>
+              <a:t>11/30/2021</a:t>
             </a:fld>
             <a:endParaRPr lang="en-US"/>
           </a:p>
@@ -2829,7 +3019,7 @@
           <a:p>
             <a:fld id="{1148A964-4D61-4951-A92D-54AF28397704}" type="datetimeFigureOut">
               <a:rPr lang="en-US" smtClean="0"/>
-              <a:t>7/13/2021</a:t>
+              <a:t>11/30/2021</a:t>
             </a:fld>
             <a:endParaRPr lang="en-US"/>
           </a:p>
@@ -3117,7 +3307,7 @@
           <a:p>
             <a:fld id="{1148A964-4D61-4951-A92D-54AF28397704}" type="datetimeFigureOut">
               <a:rPr lang="en-US" smtClean="0"/>
-              <a:t>7/13/2021</a:t>
+              <a:t>11/30/2021</a:t>
             </a:fld>
             <a:endParaRPr lang="en-US"/>
           </a:p>
@@ -3358,7 +3548,7 @@
           <a:p>
             <a:fld id="{1148A964-4D61-4951-A92D-54AF28397704}" type="datetimeFigureOut">
               <a:rPr lang="en-US" smtClean="0"/>
-              <a:t>7/13/2021</a:t>
+              <a:t>11/30/2021</a:t>
             </a:fld>
             <a:endParaRPr lang="en-US"/>
           </a:p>
@@ -3824,8 +4014,8 @@
         </p:nvSpPr>
         <p:spPr>
           <a:xfrm>
-            <a:off x="8447714" y="1166069"/>
-            <a:ext cx="713064" cy="646331"/>
+            <a:off x="8229600" y="1257509"/>
+            <a:ext cx="1296785" cy="646331"/>
           </a:xfrm>
           <a:prstGeom prst="rect">
             <a:avLst/>
@@ -3850,7 +4040,7 @@
           <a:p>
             <a:r>
               <a:rPr lang="en-US" b="1" dirty="0"/>
-              <a:t>Asia (n=5)</a:t>
+              <a:t>Bangladesh (n=5)</a:t>
             </a:r>
           </a:p>
         </p:txBody>
@@ -3994,6 +4184,852 @@
     <p:extLst>
       <p:ext uri="{BB962C8B-B14F-4D97-AF65-F5344CB8AC3E}">
         <p14:creationId xmlns:p14="http://schemas.microsoft.com/office/powerpoint/2010/main" val="2661433242"/>
+      </p:ext>
+    </p:extLst>
+  </p:cSld>
+  <p:clrMapOvr>
+    <a:masterClrMapping/>
+  </p:clrMapOvr>
+</p:sld>
+</file>
+
+<file path=ppt/slides/slide2.xml><?xml version="1.0" encoding="utf-8"?>
+<p:sld xmlns:a="http://schemas.openxmlformats.org/drawingml/2006/main" xmlns:r="http://schemas.openxmlformats.org/officeDocument/2006/relationships" xmlns:p="http://schemas.openxmlformats.org/presentationml/2006/main">
+  <p:cSld>
+    <p:spTree>
+      <p:nvGrpSpPr>
+        <p:cNvPr id="1" name=""/>
+        <p:cNvGrpSpPr/>
+        <p:nvPr/>
+      </p:nvGrpSpPr>
+      <p:grpSpPr>
+        <a:xfrm>
+          <a:off x="0" y="0"/>
+          <a:ext cx="0" cy="0"/>
+          <a:chOff x="0" y="0"/>
+          <a:chExt cx="0" cy="0"/>
+        </a:xfrm>
+      </p:grpSpPr>
+      <p:pic>
+        <p:nvPicPr>
+          <p:cNvPr id="3" name="Picture 2">
+            <a:extLst>
+              <a:ext uri="{FF2B5EF4-FFF2-40B4-BE49-F238E27FC236}">
+                <a16:creationId xmlns:a16="http://schemas.microsoft.com/office/drawing/2014/main" id="{80672B98-3669-40FA-9427-A1C54D0B20C9}"/>
+              </a:ext>
+            </a:extLst>
+          </p:cNvPr>
+          <p:cNvPicPr>
+            <a:picLocks noChangeAspect="1"/>
+          </p:cNvPicPr>
+          <p:nvPr/>
+        </p:nvPicPr>
+        <p:blipFill>
+          <a:blip r:embed="rId2"/>
+          <a:stretch>
+            <a:fillRect/>
+          </a:stretch>
+        </p:blipFill>
+        <p:spPr>
+          <a:xfrm>
+            <a:off x="215660" y="185577"/>
+            <a:ext cx="5871691" cy="2566250"/>
+          </a:xfrm>
+          <a:prstGeom prst="rect">
+            <a:avLst/>
+          </a:prstGeom>
+          <a:ln w="38100">
+            <a:solidFill>
+              <a:schemeClr val="tx1"/>
+            </a:solidFill>
+          </a:ln>
+        </p:spPr>
+      </p:pic>
+      <p:sp>
+        <p:nvSpPr>
+          <p:cNvPr id="4" name="TextBox 3">
+            <a:extLst>
+              <a:ext uri="{FF2B5EF4-FFF2-40B4-BE49-F238E27FC236}">
+                <a16:creationId xmlns:a16="http://schemas.microsoft.com/office/drawing/2014/main" id="{7F82710E-F7F7-490C-9E7C-FB4FA532E983}"/>
+              </a:ext>
+            </a:extLst>
+          </p:cNvPr>
+          <p:cNvSpPr txBox="1"/>
+          <p:nvPr/>
+        </p:nvSpPr>
+        <p:spPr>
+          <a:xfrm>
+            <a:off x="250210" y="2393896"/>
+            <a:ext cx="1112764" cy="307777"/>
+          </a:xfrm>
+          <a:prstGeom prst="rect">
+            <a:avLst/>
+          </a:prstGeom>
+          <a:solidFill>
+            <a:schemeClr val="accent1">
+              <a:lumMod val="20000"/>
+              <a:lumOff val="80000"/>
+            </a:schemeClr>
+          </a:solidFill>
+          <a:ln>
+            <a:solidFill>
+              <a:schemeClr val="tx1"/>
+            </a:solidFill>
+          </a:ln>
+        </p:spPr>
+        <p:txBody>
+          <a:bodyPr wrap="square" rtlCol="0">
+            <a:spAutoFit/>
+          </a:bodyPr>
+          <a:lstStyle/>
+          <a:p>
+            <a:r>
+              <a:rPr lang="en-US" sz="1400" dirty="0"/>
+              <a:t>1:8,000,000</a:t>
+            </a:r>
+          </a:p>
+        </p:txBody>
+      </p:sp>
+      <p:pic>
+        <p:nvPicPr>
+          <p:cNvPr id="6" name="Picture 5">
+            <a:extLst>
+              <a:ext uri="{FF2B5EF4-FFF2-40B4-BE49-F238E27FC236}">
+                <a16:creationId xmlns:a16="http://schemas.microsoft.com/office/drawing/2014/main" id="{CEA5872F-B2C5-40B5-8681-AA20492E6360}"/>
+              </a:ext>
+            </a:extLst>
+          </p:cNvPr>
+          <p:cNvPicPr>
+            <a:picLocks noChangeAspect="1"/>
+          </p:cNvPicPr>
+          <p:nvPr/>
+        </p:nvPicPr>
+        <p:blipFill>
+          <a:blip r:embed="rId3"/>
+          <a:stretch>
+            <a:fillRect/>
+          </a:stretch>
+        </p:blipFill>
+        <p:spPr>
+          <a:xfrm>
+            <a:off x="6303012" y="185577"/>
+            <a:ext cx="4445502" cy="2583607"/>
+          </a:xfrm>
+          <a:prstGeom prst="rect">
+            <a:avLst/>
+          </a:prstGeom>
+          <a:ln w="38100">
+            <a:solidFill>
+              <a:schemeClr val="tx1"/>
+            </a:solidFill>
+          </a:ln>
+        </p:spPr>
+      </p:pic>
+      <p:sp>
+        <p:nvSpPr>
+          <p:cNvPr id="7" name="TextBox 6">
+            <a:extLst>
+              <a:ext uri="{FF2B5EF4-FFF2-40B4-BE49-F238E27FC236}">
+                <a16:creationId xmlns:a16="http://schemas.microsoft.com/office/drawing/2014/main" id="{A444AF9C-2B9A-4C41-855B-4294EC50873B}"/>
+              </a:ext>
+            </a:extLst>
+          </p:cNvPr>
+          <p:cNvSpPr txBox="1"/>
+          <p:nvPr/>
+        </p:nvSpPr>
+        <p:spPr>
+          <a:xfrm>
+            <a:off x="6338236" y="2393895"/>
+            <a:ext cx="1081266" cy="307777"/>
+          </a:xfrm>
+          <a:prstGeom prst="rect">
+            <a:avLst/>
+          </a:prstGeom>
+          <a:solidFill>
+            <a:schemeClr val="accent1">
+              <a:lumMod val="20000"/>
+              <a:lumOff val="80000"/>
+            </a:schemeClr>
+          </a:solidFill>
+          <a:ln>
+            <a:solidFill>
+              <a:schemeClr val="tx1"/>
+            </a:solidFill>
+          </a:ln>
+        </p:spPr>
+        <p:txBody>
+          <a:bodyPr wrap="square" rtlCol="0">
+            <a:spAutoFit/>
+          </a:bodyPr>
+          <a:lstStyle/>
+          <a:p>
+            <a:r>
+              <a:rPr lang="en-US" sz="1400" dirty="0"/>
+              <a:t>1:5,000,000</a:t>
+            </a:r>
+          </a:p>
+        </p:txBody>
+      </p:sp>
+      <p:pic>
+        <p:nvPicPr>
+          <p:cNvPr id="9" name="Picture 8">
+            <a:extLst>
+              <a:ext uri="{FF2B5EF4-FFF2-40B4-BE49-F238E27FC236}">
+                <a16:creationId xmlns:a16="http://schemas.microsoft.com/office/drawing/2014/main" id="{47DA8961-FF82-4BD5-B2FB-A3B74B3C7421}"/>
+              </a:ext>
+            </a:extLst>
+          </p:cNvPr>
+          <p:cNvPicPr>
+            <a:picLocks noChangeAspect="1"/>
+          </p:cNvPicPr>
+          <p:nvPr/>
+        </p:nvPicPr>
+        <p:blipFill>
+          <a:blip r:embed="rId4"/>
+          <a:stretch>
+            <a:fillRect/>
+          </a:stretch>
+        </p:blipFill>
+        <p:spPr>
+          <a:xfrm>
+            <a:off x="5591534" y="3075687"/>
+            <a:ext cx="6056840" cy="3412981"/>
+          </a:xfrm>
+          <a:prstGeom prst="rect">
+            <a:avLst/>
+          </a:prstGeom>
+          <a:ln w="38100">
+            <a:solidFill>
+              <a:schemeClr val="tx1"/>
+            </a:solidFill>
+          </a:ln>
+        </p:spPr>
+      </p:pic>
+      <p:sp>
+        <p:nvSpPr>
+          <p:cNvPr id="10" name="TextBox 9">
+            <a:extLst>
+              <a:ext uri="{FF2B5EF4-FFF2-40B4-BE49-F238E27FC236}">
+                <a16:creationId xmlns:a16="http://schemas.microsoft.com/office/drawing/2014/main" id="{13D412FE-D096-4572-8010-1651D6F19C81}"/>
+              </a:ext>
+            </a:extLst>
+          </p:cNvPr>
+          <p:cNvSpPr txBox="1"/>
+          <p:nvPr/>
+        </p:nvSpPr>
+        <p:spPr>
+          <a:xfrm>
+            <a:off x="5650218" y="6103253"/>
+            <a:ext cx="1144437" cy="307777"/>
+          </a:xfrm>
+          <a:prstGeom prst="rect">
+            <a:avLst/>
+          </a:prstGeom>
+          <a:solidFill>
+            <a:schemeClr val="accent1">
+              <a:lumMod val="20000"/>
+              <a:lumOff val="80000"/>
+            </a:schemeClr>
+          </a:solidFill>
+          <a:ln>
+            <a:solidFill>
+              <a:schemeClr val="tx1"/>
+            </a:solidFill>
+          </a:ln>
+        </p:spPr>
+        <p:txBody>
+          <a:bodyPr wrap="square" rtlCol="0">
+            <a:spAutoFit/>
+          </a:bodyPr>
+          <a:lstStyle/>
+          <a:p>
+            <a:r>
+              <a:rPr lang="en-US" sz="1400" dirty="0"/>
+              <a:t>1:10,000,000</a:t>
+            </a:r>
+          </a:p>
+        </p:txBody>
+      </p:sp>
+      <p:pic>
+        <p:nvPicPr>
+          <p:cNvPr id="12" name="Picture 11">
+            <a:extLst>
+              <a:ext uri="{FF2B5EF4-FFF2-40B4-BE49-F238E27FC236}">
+                <a16:creationId xmlns:a16="http://schemas.microsoft.com/office/drawing/2014/main" id="{0FF468C4-AFCF-453A-8B98-AE356A5D2D22}"/>
+              </a:ext>
+            </a:extLst>
+          </p:cNvPr>
+          <p:cNvPicPr>
+            <a:picLocks noChangeAspect="1"/>
+          </p:cNvPicPr>
+          <p:nvPr/>
+        </p:nvPicPr>
+        <p:blipFill>
+          <a:blip r:embed="rId5"/>
+          <a:stretch>
+            <a:fillRect/>
+          </a:stretch>
+        </p:blipFill>
+        <p:spPr>
+          <a:xfrm>
+            <a:off x="0" y="3490187"/>
+            <a:ext cx="5404536" cy="2122098"/>
+          </a:xfrm>
+          <a:prstGeom prst="rect">
+            <a:avLst/>
+          </a:prstGeom>
+        </p:spPr>
+      </p:pic>
+      <p:sp>
+        <p:nvSpPr>
+          <p:cNvPr id="13" name="TextBox 12">
+            <a:extLst>
+              <a:ext uri="{FF2B5EF4-FFF2-40B4-BE49-F238E27FC236}">
+                <a16:creationId xmlns:a16="http://schemas.microsoft.com/office/drawing/2014/main" id="{EE849065-EA26-4E8D-9FA1-74C1C82BB7AC}"/>
+              </a:ext>
+            </a:extLst>
+          </p:cNvPr>
+          <p:cNvSpPr txBox="1"/>
+          <p:nvPr/>
+        </p:nvSpPr>
+        <p:spPr>
+          <a:xfrm>
+            <a:off x="116456" y="5165315"/>
+            <a:ext cx="1253707" cy="307777"/>
+          </a:xfrm>
+          <a:prstGeom prst="rect">
+            <a:avLst/>
+          </a:prstGeom>
+          <a:solidFill>
+            <a:schemeClr val="tx2">
+              <a:lumMod val="20000"/>
+              <a:lumOff val="80000"/>
+            </a:schemeClr>
+          </a:solidFill>
+          <a:ln>
+            <a:solidFill>
+              <a:schemeClr val="tx1"/>
+            </a:solidFill>
+          </a:ln>
+        </p:spPr>
+        <p:txBody>
+          <a:bodyPr wrap="square" rtlCol="0">
+            <a:spAutoFit/>
+          </a:bodyPr>
+          <a:lstStyle/>
+          <a:p>
+            <a:r>
+              <a:rPr lang="en-US" sz="1400" dirty="0"/>
+              <a:t>1:100,000,000</a:t>
+            </a:r>
+          </a:p>
+        </p:txBody>
+      </p:sp>
+      <p:sp>
+        <p:nvSpPr>
+          <p:cNvPr id="14" name="Rectangle 13">
+            <a:extLst>
+              <a:ext uri="{FF2B5EF4-FFF2-40B4-BE49-F238E27FC236}">
+                <a16:creationId xmlns:a16="http://schemas.microsoft.com/office/drawing/2014/main" id="{1B3F374B-E2DC-49FC-948E-3511C130668C}"/>
+              </a:ext>
+            </a:extLst>
+          </p:cNvPr>
+          <p:cNvSpPr/>
+          <p:nvPr/>
+        </p:nvSpPr>
+        <p:spPr>
+          <a:xfrm>
+            <a:off x="785003" y="4026630"/>
+            <a:ext cx="887083" cy="369332"/>
+          </a:xfrm>
+          <a:prstGeom prst="rect">
+            <a:avLst/>
+          </a:prstGeom>
+          <a:noFill/>
+          <a:ln w="38100">
+            <a:solidFill>
+              <a:schemeClr val="tx1"/>
+            </a:solidFill>
+          </a:ln>
+        </p:spPr>
+        <p:style>
+          <a:lnRef idx="2">
+            <a:schemeClr val="accent1">
+              <a:shade val="50000"/>
+            </a:schemeClr>
+          </a:lnRef>
+          <a:fillRef idx="1">
+            <a:schemeClr val="accent1"/>
+          </a:fillRef>
+          <a:effectRef idx="0">
+            <a:schemeClr val="accent1"/>
+          </a:effectRef>
+          <a:fontRef idx="minor">
+            <a:schemeClr val="lt1"/>
+          </a:fontRef>
+        </p:style>
+        <p:txBody>
+          <a:bodyPr rtlCol="0" anchor="ctr"/>
+          <a:lstStyle/>
+          <a:p>
+            <a:pPr algn="ctr"/>
+            <a:endParaRPr lang="en-US"/>
+          </a:p>
+        </p:txBody>
+      </p:sp>
+      <p:sp>
+        <p:nvSpPr>
+          <p:cNvPr id="15" name="Rectangle 14">
+            <a:extLst>
+              <a:ext uri="{FF2B5EF4-FFF2-40B4-BE49-F238E27FC236}">
+                <a16:creationId xmlns:a16="http://schemas.microsoft.com/office/drawing/2014/main" id="{01409D9B-961C-4016-9FFB-B9854778EE87}"/>
+              </a:ext>
+            </a:extLst>
+          </p:cNvPr>
+          <p:cNvSpPr/>
+          <p:nvPr/>
+        </p:nvSpPr>
+        <p:spPr>
+          <a:xfrm>
+            <a:off x="2360763" y="3902984"/>
+            <a:ext cx="501770" cy="369332"/>
+          </a:xfrm>
+          <a:prstGeom prst="rect">
+            <a:avLst/>
+          </a:prstGeom>
+          <a:noFill/>
+          <a:ln w="38100">
+            <a:solidFill>
+              <a:schemeClr val="tx1"/>
+            </a:solidFill>
+          </a:ln>
+        </p:spPr>
+        <p:style>
+          <a:lnRef idx="2">
+            <a:schemeClr val="accent1">
+              <a:shade val="50000"/>
+            </a:schemeClr>
+          </a:lnRef>
+          <a:fillRef idx="1">
+            <a:schemeClr val="accent1"/>
+          </a:fillRef>
+          <a:effectRef idx="0">
+            <a:schemeClr val="accent1"/>
+          </a:effectRef>
+          <a:fontRef idx="minor">
+            <a:schemeClr val="lt1"/>
+          </a:fontRef>
+        </p:style>
+        <p:txBody>
+          <a:bodyPr rtlCol="0" anchor="ctr"/>
+          <a:lstStyle/>
+          <a:p>
+            <a:pPr algn="ctr"/>
+            <a:endParaRPr lang="en-US"/>
+          </a:p>
+        </p:txBody>
+      </p:sp>
+      <p:sp>
+        <p:nvSpPr>
+          <p:cNvPr id="16" name="Rectangle 15">
+            <a:extLst>
+              <a:ext uri="{FF2B5EF4-FFF2-40B4-BE49-F238E27FC236}">
+                <a16:creationId xmlns:a16="http://schemas.microsoft.com/office/drawing/2014/main" id="{AD39DA37-B73F-4523-A583-7085DCC7BE36}"/>
+              </a:ext>
+            </a:extLst>
+          </p:cNvPr>
+          <p:cNvSpPr/>
+          <p:nvPr/>
+        </p:nvSpPr>
+        <p:spPr>
+          <a:xfrm>
+            <a:off x="3574214" y="4272316"/>
+            <a:ext cx="573654" cy="369332"/>
+          </a:xfrm>
+          <a:prstGeom prst="rect">
+            <a:avLst/>
+          </a:prstGeom>
+          <a:noFill/>
+          <a:ln w="38100">
+            <a:solidFill>
+              <a:schemeClr val="tx1"/>
+            </a:solidFill>
+          </a:ln>
+        </p:spPr>
+        <p:style>
+          <a:lnRef idx="2">
+            <a:schemeClr val="accent1">
+              <a:shade val="50000"/>
+            </a:schemeClr>
+          </a:lnRef>
+          <a:fillRef idx="1">
+            <a:schemeClr val="accent1"/>
+          </a:fillRef>
+          <a:effectRef idx="0">
+            <a:schemeClr val="accent1"/>
+          </a:effectRef>
+          <a:fontRef idx="minor">
+            <a:schemeClr val="lt1"/>
+          </a:fontRef>
+        </p:style>
+        <p:txBody>
+          <a:bodyPr rtlCol="0" anchor="ctr"/>
+          <a:lstStyle/>
+          <a:p>
+            <a:pPr algn="ctr"/>
+            <a:endParaRPr lang="en-US"/>
+          </a:p>
+        </p:txBody>
+      </p:sp>
+      <p:cxnSp>
+        <p:nvCxnSpPr>
+          <p:cNvPr id="19" name="Straight Connector 18">
+            <a:extLst>
+              <a:ext uri="{FF2B5EF4-FFF2-40B4-BE49-F238E27FC236}">
+                <a16:creationId xmlns:a16="http://schemas.microsoft.com/office/drawing/2014/main" id="{420AB400-7C4A-46BD-B025-AA6C0FBF56FB}"/>
+              </a:ext>
+            </a:extLst>
+          </p:cNvPr>
+          <p:cNvCxnSpPr>
+            <a:cxnSpLocks/>
+            <a:stCxn id="16" idx="3"/>
+          </p:cNvCxnSpPr>
+          <p:nvPr/>
+        </p:nvCxnSpPr>
+        <p:spPr>
+          <a:xfrm flipV="1">
+            <a:off x="4147868" y="3536463"/>
+            <a:ext cx="1450855" cy="920519"/>
+          </a:xfrm>
+          <a:prstGeom prst="line">
+            <a:avLst/>
+          </a:prstGeom>
+          <a:ln w="38100">
+            <a:solidFill>
+              <a:schemeClr val="tx1"/>
+            </a:solidFill>
+          </a:ln>
+        </p:spPr>
+        <p:style>
+          <a:lnRef idx="1">
+            <a:schemeClr val="accent1"/>
+          </a:lnRef>
+          <a:fillRef idx="0">
+            <a:schemeClr val="accent1"/>
+          </a:fillRef>
+          <a:effectRef idx="0">
+            <a:schemeClr val="accent1"/>
+          </a:effectRef>
+          <a:fontRef idx="minor">
+            <a:schemeClr val="tx1"/>
+          </a:fontRef>
+        </p:style>
+      </p:cxnSp>
+      <p:cxnSp>
+        <p:nvCxnSpPr>
+          <p:cNvPr id="22" name="Straight Connector 21">
+            <a:extLst>
+              <a:ext uri="{FF2B5EF4-FFF2-40B4-BE49-F238E27FC236}">
+                <a16:creationId xmlns:a16="http://schemas.microsoft.com/office/drawing/2014/main" id="{436508F2-DA52-4342-96D6-199D3DCB015C}"/>
+              </a:ext>
+            </a:extLst>
+          </p:cNvPr>
+          <p:cNvCxnSpPr>
+            <a:cxnSpLocks/>
+            <a:stCxn id="15" idx="0"/>
+            <a:endCxn id="6" idx="1"/>
+          </p:cNvCxnSpPr>
+          <p:nvPr/>
+        </p:nvCxnSpPr>
+        <p:spPr>
+          <a:xfrm flipV="1">
+            <a:off x="2611648" y="1477381"/>
+            <a:ext cx="3691364" cy="2425603"/>
+          </a:xfrm>
+          <a:prstGeom prst="line">
+            <a:avLst/>
+          </a:prstGeom>
+          <a:ln w="38100">
+            <a:solidFill>
+              <a:schemeClr val="tx1"/>
+            </a:solidFill>
+          </a:ln>
+        </p:spPr>
+        <p:style>
+          <a:lnRef idx="1">
+            <a:schemeClr val="accent1"/>
+          </a:lnRef>
+          <a:fillRef idx="0">
+            <a:schemeClr val="accent1"/>
+          </a:fillRef>
+          <a:effectRef idx="0">
+            <a:schemeClr val="accent1"/>
+          </a:effectRef>
+          <a:fontRef idx="minor">
+            <a:schemeClr val="tx1"/>
+          </a:fontRef>
+        </p:style>
+      </p:cxnSp>
+      <p:sp>
+        <p:nvSpPr>
+          <p:cNvPr id="26" name="TextBox 25">
+            <a:extLst>
+              <a:ext uri="{FF2B5EF4-FFF2-40B4-BE49-F238E27FC236}">
+                <a16:creationId xmlns:a16="http://schemas.microsoft.com/office/drawing/2014/main" id="{A523F9B0-5368-4B8A-A3D4-F21B5C89366E}"/>
+              </a:ext>
+            </a:extLst>
+          </p:cNvPr>
+          <p:cNvSpPr txBox="1"/>
+          <p:nvPr/>
+        </p:nvSpPr>
+        <p:spPr>
+          <a:xfrm>
+            <a:off x="250210" y="225155"/>
+            <a:ext cx="1518249" cy="369332"/>
+          </a:xfrm>
+          <a:prstGeom prst="rect">
+            <a:avLst/>
+          </a:prstGeom>
+          <a:solidFill>
+            <a:schemeClr val="tx2">
+              <a:lumMod val="60000"/>
+              <a:lumOff val="40000"/>
+            </a:schemeClr>
+          </a:solidFill>
+          <a:ln>
+            <a:solidFill>
+              <a:schemeClr val="tx1"/>
+            </a:solidFill>
+          </a:ln>
+        </p:spPr>
+        <p:txBody>
+          <a:bodyPr wrap="square" rtlCol="0">
+            <a:spAutoFit/>
+          </a:bodyPr>
+          <a:lstStyle/>
+          <a:p>
+            <a:r>
+              <a:rPr lang="en-US" b="1" dirty="0"/>
+              <a:t>United States</a:t>
+            </a:r>
+          </a:p>
+        </p:txBody>
+      </p:sp>
+      <p:sp>
+        <p:nvSpPr>
+          <p:cNvPr id="27" name="TextBox 26">
+            <a:extLst>
+              <a:ext uri="{FF2B5EF4-FFF2-40B4-BE49-F238E27FC236}">
+                <a16:creationId xmlns:a16="http://schemas.microsoft.com/office/drawing/2014/main" id="{00CE480E-AEC3-4E69-855D-1DE28CBE320F}"/>
+              </a:ext>
+            </a:extLst>
+          </p:cNvPr>
+          <p:cNvSpPr txBox="1"/>
+          <p:nvPr/>
+        </p:nvSpPr>
+        <p:spPr>
+          <a:xfrm>
+            <a:off x="6355489" y="225155"/>
+            <a:ext cx="856194" cy="369332"/>
+          </a:xfrm>
+          <a:prstGeom prst="rect">
+            <a:avLst/>
+          </a:prstGeom>
+          <a:solidFill>
+            <a:schemeClr val="tx2">
+              <a:lumMod val="60000"/>
+              <a:lumOff val="40000"/>
+            </a:schemeClr>
+          </a:solidFill>
+          <a:ln>
+            <a:solidFill>
+              <a:schemeClr val="tx1"/>
+            </a:solidFill>
+          </a:ln>
+        </p:spPr>
+        <p:txBody>
+          <a:bodyPr wrap="square" rtlCol="0">
+            <a:spAutoFit/>
+          </a:bodyPr>
+          <a:lstStyle/>
+          <a:p>
+            <a:r>
+              <a:rPr lang="en-US" b="1" dirty="0"/>
+              <a:t>Europe</a:t>
+            </a:r>
+          </a:p>
+        </p:txBody>
+      </p:sp>
+      <p:sp>
+        <p:nvSpPr>
+          <p:cNvPr id="28" name="TextBox 27">
+            <a:extLst>
+              <a:ext uri="{FF2B5EF4-FFF2-40B4-BE49-F238E27FC236}">
+                <a16:creationId xmlns:a16="http://schemas.microsoft.com/office/drawing/2014/main" id="{9B9E3660-C4D5-42F9-921B-F71A5CDDB5DF}"/>
+              </a:ext>
+            </a:extLst>
+          </p:cNvPr>
+          <p:cNvSpPr txBox="1"/>
+          <p:nvPr/>
+        </p:nvSpPr>
+        <p:spPr>
+          <a:xfrm>
+            <a:off x="5641004" y="3128374"/>
+            <a:ext cx="1311887" cy="369332"/>
+          </a:xfrm>
+          <a:prstGeom prst="rect">
+            <a:avLst/>
+          </a:prstGeom>
+          <a:solidFill>
+            <a:schemeClr val="tx2">
+              <a:lumMod val="60000"/>
+              <a:lumOff val="40000"/>
+            </a:schemeClr>
+          </a:solidFill>
+          <a:ln>
+            <a:solidFill>
+              <a:schemeClr val="tx1"/>
+            </a:solidFill>
+          </a:ln>
+        </p:spPr>
+        <p:txBody>
+          <a:bodyPr wrap="square" rtlCol="0">
+            <a:spAutoFit/>
+          </a:bodyPr>
+          <a:lstStyle/>
+          <a:p>
+            <a:r>
+              <a:rPr lang="en-US" b="1" dirty="0"/>
+              <a:t>Bangladesh</a:t>
+            </a:r>
+          </a:p>
+        </p:txBody>
+      </p:sp>
+      <p:sp>
+        <p:nvSpPr>
+          <p:cNvPr id="32" name="TextBox 31">
+            <a:extLst>
+              <a:ext uri="{FF2B5EF4-FFF2-40B4-BE49-F238E27FC236}">
+                <a16:creationId xmlns:a16="http://schemas.microsoft.com/office/drawing/2014/main" id="{FA6A484E-C77B-45B5-87F9-50C5CD52A81F}"/>
+              </a:ext>
+            </a:extLst>
+          </p:cNvPr>
+          <p:cNvSpPr txBox="1"/>
+          <p:nvPr/>
+        </p:nvSpPr>
+        <p:spPr>
+          <a:xfrm>
+            <a:off x="57529" y="5849907"/>
+            <a:ext cx="2342029" cy="923330"/>
+          </a:xfrm>
+          <a:prstGeom prst="rect">
+            <a:avLst/>
+          </a:prstGeom>
+          <a:solidFill>
+            <a:schemeClr val="tx2">
+              <a:lumMod val="60000"/>
+              <a:lumOff val="40000"/>
+            </a:schemeClr>
+          </a:solidFill>
+          <a:ln>
+            <a:solidFill>
+              <a:schemeClr val="tx1"/>
+            </a:solidFill>
+          </a:ln>
+        </p:spPr>
+        <p:txBody>
+          <a:bodyPr wrap="square" rtlCol="0">
+            <a:spAutoFit/>
+          </a:bodyPr>
+          <a:lstStyle/>
+          <a:p>
+            <a:r>
+              <a:rPr lang="en-US" b="1" dirty="0">
+                <a:solidFill>
+                  <a:srgbClr val="2DEBA5"/>
+                </a:solidFill>
+              </a:rPr>
+              <a:t>Durand et al. (2016)</a:t>
+            </a:r>
+          </a:p>
+          <a:p>
+            <a:r>
+              <a:rPr lang="en-US" b="1" dirty="0" err="1">
+                <a:solidFill>
+                  <a:srgbClr val="E04983"/>
+                </a:solidFill>
+              </a:rPr>
+              <a:t>Frasson</a:t>
+            </a:r>
+            <a:r>
+              <a:rPr lang="en-US" b="1" dirty="0">
+                <a:solidFill>
+                  <a:srgbClr val="E04983"/>
+                </a:solidFill>
+              </a:rPr>
+              <a:t> et al. (2021)</a:t>
+            </a:r>
+          </a:p>
+          <a:p>
+            <a:r>
+              <a:rPr lang="en-US" b="1" dirty="0">
+                <a:solidFill>
+                  <a:srgbClr val="BFD81D"/>
+                </a:solidFill>
+              </a:rPr>
+              <a:t>Beaulieu et al. (2012)</a:t>
+            </a:r>
+          </a:p>
+        </p:txBody>
+      </p:sp>
+      <p:cxnSp>
+        <p:nvCxnSpPr>
+          <p:cNvPr id="18" name="Straight Connector 17">
+            <a:extLst>
+              <a:ext uri="{FF2B5EF4-FFF2-40B4-BE49-F238E27FC236}">
+                <a16:creationId xmlns:a16="http://schemas.microsoft.com/office/drawing/2014/main" id="{01B9A262-088E-498C-951B-923BE4590C0B}"/>
+              </a:ext>
+            </a:extLst>
+          </p:cNvPr>
+          <p:cNvCxnSpPr>
+            <a:stCxn id="14" idx="0"/>
+            <a:endCxn id="3" idx="2"/>
+          </p:cNvCxnSpPr>
+          <p:nvPr/>
+        </p:nvCxnSpPr>
+        <p:spPr>
+          <a:xfrm flipV="1">
+            <a:off x="1228545" y="2751827"/>
+            <a:ext cx="1922961" cy="1274803"/>
+          </a:xfrm>
+          <a:prstGeom prst="line">
+            <a:avLst/>
+          </a:prstGeom>
+          <a:ln w="38100">
+            <a:solidFill>
+              <a:schemeClr val="tx1"/>
+            </a:solidFill>
+          </a:ln>
+        </p:spPr>
+        <p:style>
+          <a:lnRef idx="1">
+            <a:schemeClr val="accent1"/>
+          </a:lnRef>
+          <a:fillRef idx="0">
+            <a:schemeClr val="accent1"/>
+          </a:fillRef>
+          <a:effectRef idx="0">
+            <a:schemeClr val="accent1"/>
+          </a:effectRef>
+          <a:fontRef idx="minor">
+            <a:schemeClr val="tx1"/>
+          </a:fontRef>
+        </p:style>
+      </p:cxnSp>
+    </p:spTree>
+    <p:extLst>
+      <p:ext uri="{BB962C8B-B14F-4D97-AF65-F5344CB8AC3E}">
+        <p14:creationId xmlns:p14="http://schemas.microsoft.com/office/powerpoint/2010/main" val="2595326838"/>
       </p:ext>
     </p:extLst>
   </p:cSld>

</xml_diff>